<commit_message>
add comment about post processing  to job workflow diagram in /docs
</commit_message>
<xml_diff>
--- a/docs/jobscript flow diagram.pptx
+++ b/docs/jobscript flow diagram.pptx
@@ -104,6 +104,11 @@
       </a:defRPr>
     </a:lvl9pPr>
   </p:defaultTextStyle>
+  <p:extLst>
+    <p:ext uri="{EFAFB233-063F-42B5-8137-9DF3F51BA10A}">
+      <p15:sldGuideLst xmlns:p15="http://schemas.microsoft.com/office/powerpoint/2012/main"/>
+    </p:ext>
+  </p:extLst>
 </p:presentation>
 </file>
 
@@ -11914,7 +11919,7 @@
           <a:p>
             <a:fld id="{5461D350-BF87-448E-807C-53F15C085EC1}" type="datetimeFigureOut">
               <a:rPr lang="en-GB" smtClean="0"/>
-              <a:t>07/11/2021</a:t>
+              <a:t>26/11/2021</a:t>
             </a:fld>
             <a:endParaRPr lang="en-GB"/>
           </a:p>
@@ -12114,7 +12119,7 @@
           <a:p>
             <a:fld id="{5461D350-BF87-448E-807C-53F15C085EC1}" type="datetimeFigureOut">
               <a:rPr lang="en-GB" smtClean="0"/>
-              <a:t>07/11/2021</a:t>
+              <a:t>26/11/2021</a:t>
             </a:fld>
             <a:endParaRPr lang="en-GB"/>
           </a:p>
@@ -12324,7 +12329,7 @@
           <a:p>
             <a:fld id="{5461D350-BF87-448E-807C-53F15C085EC1}" type="datetimeFigureOut">
               <a:rPr lang="en-GB" smtClean="0"/>
-              <a:t>07/11/2021</a:t>
+              <a:t>26/11/2021</a:t>
             </a:fld>
             <a:endParaRPr lang="en-GB"/>
           </a:p>
@@ -12524,7 +12529,7 @@
           <a:p>
             <a:fld id="{5461D350-BF87-448E-807C-53F15C085EC1}" type="datetimeFigureOut">
               <a:rPr lang="en-GB" smtClean="0"/>
-              <a:t>07/11/2021</a:t>
+              <a:t>26/11/2021</a:t>
             </a:fld>
             <a:endParaRPr lang="en-GB"/>
           </a:p>
@@ -12800,7 +12805,7 @@
           <a:p>
             <a:fld id="{5461D350-BF87-448E-807C-53F15C085EC1}" type="datetimeFigureOut">
               <a:rPr lang="en-GB" smtClean="0"/>
-              <a:t>07/11/2021</a:t>
+              <a:t>26/11/2021</a:t>
             </a:fld>
             <a:endParaRPr lang="en-GB"/>
           </a:p>
@@ -13068,7 +13073,7 @@
           <a:p>
             <a:fld id="{5461D350-BF87-448E-807C-53F15C085EC1}" type="datetimeFigureOut">
               <a:rPr lang="en-GB" smtClean="0"/>
-              <a:t>07/11/2021</a:t>
+              <a:t>26/11/2021</a:t>
             </a:fld>
             <a:endParaRPr lang="en-GB"/>
           </a:p>
@@ -13483,7 +13488,7 @@
           <a:p>
             <a:fld id="{5461D350-BF87-448E-807C-53F15C085EC1}" type="datetimeFigureOut">
               <a:rPr lang="en-GB" smtClean="0"/>
-              <a:t>07/11/2021</a:t>
+              <a:t>26/11/2021</a:t>
             </a:fld>
             <a:endParaRPr lang="en-GB"/>
           </a:p>
@@ -13625,7 +13630,7 @@
           <a:p>
             <a:fld id="{5461D350-BF87-448E-807C-53F15C085EC1}" type="datetimeFigureOut">
               <a:rPr lang="en-GB" smtClean="0"/>
-              <a:t>07/11/2021</a:t>
+              <a:t>26/11/2021</a:t>
             </a:fld>
             <a:endParaRPr lang="en-GB"/>
           </a:p>
@@ -13738,7 +13743,7 @@
           <a:p>
             <a:fld id="{5461D350-BF87-448E-807C-53F15C085EC1}" type="datetimeFigureOut">
               <a:rPr lang="en-GB" smtClean="0"/>
-              <a:t>07/11/2021</a:t>
+              <a:t>26/11/2021</a:t>
             </a:fld>
             <a:endParaRPr lang="en-GB"/>
           </a:p>
@@ -14051,7 +14056,7 @@
           <a:p>
             <a:fld id="{5461D350-BF87-448E-807C-53F15C085EC1}" type="datetimeFigureOut">
               <a:rPr lang="en-GB" smtClean="0"/>
-              <a:t>07/11/2021</a:t>
+              <a:t>26/11/2021</a:t>
             </a:fld>
             <a:endParaRPr lang="en-GB"/>
           </a:p>
@@ -14340,7 +14345,7 @@
           <a:p>
             <a:fld id="{5461D350-BF87-448E-807C-53F15C085EC1}" type="datetimeFigureOut">
               <a:rPr lang="en-GB" smtClean="0"/>
-              <a:t>07/11/2021</a:t>
+              <a:t>26/11/2021</a:t>
             </a:fld>
             <a:endParaRPr lang="en-GB"/>
           </a:p>
@@ -14583,7 +14588,7 @@
           <a:p>
             <a:fld id="{5461D350-BF87-448E-807C-53F15C085EC1}" type="datetimeFigureOut">
               <a:rPr lang="en-GB" smtClean="0"/>
-              <a:t>07/11/2021</a:t>
+              <a:t>26/11/2021</a:t>
             </a:fld>
             <a:endParaRPr lang="en-GB"/>
           </a:p>
@@ -15350,6 +15355,87 @@
           </a:p>
         </p:txBody>
       </p:sp>
+      <p:cxnSp>
+        <p:nvCxnSpPr>
+          <p:cNvPr id="11" name="Straight Arrow Connector 10">
+            <a:extLst>
+              <a:ext uri="{FF2B5EF4-FFF2-40B4-BE49-F238E27FC236}">
+                <a16:creationId xmlns:a16="http://schemas.microsoft.com/office/drawing/2014/main" id="{B73C1C1F-6A1A-4816-8E34-0C9FA84CF6B6}"/>
+              </a:ext>
+            </a:extLst>
+          </p:cNvPr>
+          <p:cNvCxnSpPr>
+            <a:cxnSpLocks/>
+          </p:cNvCxnSpPr>
+          <p:nvPr/>
+        </p:nvCxnSpPr>
+        <p:spPr>
+          <a:xfrm flipH="1">
+            <a:off x="7805474" y="1178163"/>
+            <a:ext cx="345468" cy="387926"/>
+          </a:xfrm>
+          <a:prstGeom prst="straightConnector1">
+            <a:avLst/>
+          </a:prstGeom>
+          <a:ln w="25400">
+            <a:headEnd type="none"/>
+            <a:tailEnd type="triangle" w="lg" len="lg"/>
+          </a:ln>
+        </p:spPr>
+        <p:style>
+          <a:lnRef idx="1">
+            <a:schemeClr val="accent1"/>
+          </a:lnRef>
+          <a:fillRef idx="0">
+            <a:schemeClr val="accent1"/>
+          </a:fillRef>
+          <a:effectRef idx="0">
+            <a:schemeClr val="accent1"/>
+          </a:effectRef>
+          <a:fontRef idx="minor">
+            <a:schemeClr val="tx1"/>
+          </a:fontRef>
+        </p:style>
+      </p:cxnSp>
+      <p:sp>
+        <p:nvSpPr>
+          <p:cNvPr id="17" name="TextBox 16">
+            <a:extLst>
+              <a:ext uri="{FF2B5EF4-FFF2-40B4-BE49-F238E27FC236}">
+                <a16:creationId xmlns:a16="http://schemas.microsoft.com/office/drawing/2014/main" id="{AED0D85B-7744-4544-AA61-410C8093EB81}"/>
+              </a:ext>
+            </a:extLst>
+          </p:cNvPr>
+          <p:cNvSpPr txBox="1"/>
+          <p:nvPr/>
+        </p:nvSpPr>
+        <p:spPr>
+          <a:xfrm>
+            <a:off x="8237550" y="646192"/>
+            <a:ext cx="3954450" cy="923330"/>
+          </a:xfrm>
+          <a:prstGeom prst="rect">
+            <a:avLst/>
+          </a:prstGeom>
+          <a:noFill/>
+        </p:spPr>
+        <p:txBody>
+          <a:bodyPr wrap="square" rtlCol="0">
+            <a:spAutoFit/>
+          </a:bodyPr>
+          <a:lstStyle/>
+          <a:p>
+            <a:r>
+              <a:rPr lang="en-GB" dirty="0">
+                <a:solidFill>
+                  <a:schemeClr val="accent1"/>
+                </a:solidFill>
+              </a:rPr>
+              <a:t>Resource intensive processing may well need to be itself a second batch job or interactive session on a compute node</a:t>
+            </a:r>
+          </a:p>
+        </p:txBody>
+      </p:sp>
     </p:spTree>
     <p:extLst>
       <p:ext uri="{BB962C8B-B14F-4D97-AF65-F5344CB8AC3E}">

</xml_diff>